<commit_message>
added peas in a pod slides
</commit_message>
<xml_diff>
--- a/fun-with-k8s.pptx
+++ b/fun-with-k8s.pptx
@@ -10,13 +10,14 @@
     <p:sldId id="258" r:id="rId4"/>
     <p:sldId id="260" r:id="rId5"/>
     <p:sldId id="272" r:id="rId6"/>
-    <p:sldId id="273" r:id="rId7"/>
-    <p:sldId id="278" r:id="rId8"/>
-    <p:sldId id="279" r:id="rId9"/>
-    <p:sldId id="280" r:id="rId10"/>
-    <p:sldId id="277" r:id="rId11"/>
-    <p:sldId id="259" r:id="rId12"/>
-    <p:sldId id="268" r:id="rId13"/>
+    <p:sldId id="281" r:id="rId7"/>
+    <p:sldId id="273" r:id="rId8"/>
+    <p:sldId id="278" r:id="rId9"/>
+    <p:sldId id="279" r:id="rId10"/>
+    <p:sldId id="280" r:id="rId11"/>
+    <p:sldId id="277" r:id="rId12"/>
+    <p:sldId id="259" r:id="rId13"/>
+    <p:sldId id="268" r:id="rId14"/>
   </p:sldIdLst>
   <p:sldSz cx="12192000" cy="6858000"/>
   <p:notesSz cx="6858000" cy="9144000"/>
@@ -8759,7 +8760,7 @@
           <a:p>
             <a:fld id="{0117283B-F0A5-4202-AA1A-3796A1F2E447}" type="datetimeFigureOut">
               <a:rPr lang="en-US" smtClean="0"/>
-              <a:t>2/7/2020</a:t>
+              <a:t>2/24/2020</a:t>
             </a:fld>
             <a:endParaRPr lang="en-US"/>
           </a:p>
@@ -8957,7 +8958,7 @@
           <a:p>
             <a:fld id="{0117283B-F0A5-4202-AA1A-3796A1F2E447}" type="datetimeFigureOut">
               <a:rPr lang="en-US" smtClean="0"/>
-              <a:t>2/7/2020</a:t>
+              <a:t>2/24/2020</a:t>
             </a:fld>
             <a:endParaRPr lang="en-US"/>
           </a:p>
@@ -9165,7 +9166,7 @@
           <a:p>
             <a:fld id="{0117283B-F0A5-4202-AA1A-3796A1F2E447}" type="datetimeFigureOut">
               <a:rPr lang="en-US" smtClean="0"/>
-              <a:t>2/7/2020</a:t>
+              <a:t>2/24/2020</a:t>
             </a:fld>
             <a:endParaRPr lang="en-US"/>
           </a:p>
@@ -9363,7 +9364,7 @@
           <a:p>
             <a:fld id="{0117283B-F0A5-4202-AA1A-3796A1F2E447}" type="datetimeFigureOut">
               <a:rPr lang="en-US" smtClean="0"/>
-              <a:t>2/7/2020</a:t>
+              <a:t>2/24/2020</a:t>
             </a:fld>
             <a:endParaRPr lang="en-US"/>
           </a:p>
@@ -9638,7 +9639,7 @@
           <a:p>
             <a:fld id="{0117283B-F0A5-4202-AA1A-3796A1F2E447}" type="datetimeFigureOut">
               <a:rPr lang="en-US" smtClean="0"/>
-              <a:t>2/7/2020</a:t>
+              <a:t>2/24/2020</a:t>
             </a:fld>
             <a:endParaRPr lang="en-US"/>
           </a:p>
@@ -9903,7 +9904,7 @@
           <a:p>
             <a:fld id="{0117283B-F0A5-4202-AA1A-3796A1F2E447}" type="datetimeFigureOut">
               <a:rPr lang="en-US" smtClean="0"/>
-              <a:t>2/7/2020</a:t>
+              <a:t>2/24/2020</a:t>
             </a:fld>
             <a:endParaRPr lang="en-US"/>
           </a:p>
@@ -10315,7 +10316,7 @@
           <a:p>
             <a:fld id="{0117283B-F0A5-4202-AA1A-3796A1F2E447}" type="datetimeFigureOut">
               <a:rPr lang="en-US" smtClean="0"/>
-              <a:t>2/7/2020</a:t>
+              <a:t>2/24/2020</a:t>
             </a:fld>
             <a:endParaRPr lang="en-US"/>
           </a:p>
@@ -10456,7 +10457,7 @@
           <a:p>
             <a:fld id="{0117283B-F0A5-4202-AA1A-3796A1F2E447}" type="datetimeFigureOut">
               <a:rPr lang="en-US" smtClean="0"/>
-              <a:t>2/7/2020</a:t>
+              <a:t>2/24/2020</a:t>
             </a:fld>
             <a:endParaRPr lang="en-US"/>
           </a:p>
@@ -10569,7 +10570,7 @@
           <a:p>
             <a:fld id="{0117283B-F0A5-4202-AA1A-3796A1F2E447}" type="datetimeFigureOut">
               <a:rPr lang="en-US" smtClean="0"/>
-              <a:t>2/7/2020</a:t>
+              <a:t>2/24/2020</a:t>
             </a:fld>
             <a:endParaRPr lang="en-US"/>
           </a:p>
@@ -10880,7 +10881,7 @@
           <a:p>
             <a:fld id="{0117283B-F0A5-4202-AA1A-3796A1F2E447}" type="datetimeFigureOut">
               <a:rPr lang="en-US" smtClean="0"/>
-              <a:t>2/7/2020</a:t>
+              <a:t>2/24/2020</a:t>
             </a:fld>
             <a:endParaRPr lang="en-US"/>
           </a:p>
@@ -11168,7 +11169,7 @@
           <a:p>
             <a:fld id="{0117283B-F0A5-4202-AA1A-3796A1F2E447}" type="datetimeFigureOut">
               <a:rPr lang="en-US" smtClean="0"/>
-              <a:t>2/7/2020</a:t>
+              <a:t>2/24/2020</a:t>
             </a:fld>
             <a:endParaRPr lang="en-US"/>
           </a:p>
@@ -11409,7 +11410,7 @@
           <a:p>
             <a:fld id="{0117283B-F0A5-4202-AA1A-3796A1F2E447}" type="datetimeFigureOut">
               <a:rPr lang="en-US" smtClean="0"/>
-              <a:t>2/7/2020</a:t>
+              <a:t>2/24/2020</a:t>
             </a:fld>
             <a:endParaRPr lang="en-US"/>
           </a:p>
@@ -12094,6 +12095,357 @@
     <p:bg>
       <p:bgPr>
         <a:solidFill>
+          <a:schemeClr val="bg1">
+            <a:tint val="95000"/>
+            <a:satMod val="170000"/>
+          </a:schemeClr>
+        </a:solidFill>
+        <a:effectLst/>
+      </p:bgPr>
+    </p:bg>
+    <p:spTree>
+      <p:nvGrpSpPr>
+        <p:cNvPr id="1" name=""/>
+        <p:cNvGrpSpPr/>
+        <p:nvPr/>
+      </p:nvGrpSpPr>
+      <p:grpSpPr>
+        <a:xfrm>
+          <a:off x="0" y="0"/>
+          <a:ext cx="0" cy="0"/>
+          <a:chOff x="0" y="0"/>
+          <a:chExt cx="0" cy="0"/>
+        </a:xfrm>
+      </p:grpSpPr>
+      <p:sp>
+        <p:nvSpPr>
+          <p:cNvPr id="2" name="Title 1">
+            <a:extLst>
+              <a:ext uri="{FF2B5EF4-FFF2-40B4-BE49-F238E27FC236}">
+                <a16:creationId xmlns:a16="http://schemas.microsoft.com/office/drawing/2014/main" id="{E32B1E46-F181-4C14-89B8-14D0DC17B5E0}"/>
+              </a:ext>
+            </a:extLst>
+          </p:cNvPr>
+          <p:cNvSpPr>
+            <a:spLocks noGrp="1"/>
+          </p:cNvSpPr>
+          <p:nvPr>
+            <p:ph type="title"/>
+          </p:nvPr>
+        </p:nvSpPr>
+        <p:spPr>
+          <a:xfrm>
+            <a:off x="6746628" y="1783959"/>
+            <a:ext cx="4645250" cy="2889114"/>
+          </a:xfrm>
+        </p:spPr>
+        <p:txBody>
+          <a:bodyPr vert="horz" lIns="91440" tIns="45720" rIns="91440" bIns="45720" rtlCol="0" anchor="b">
+            <a:normAutofit/>
+          </a:bodyPr>
+          <a:lstStyle/>
+          <a:p>
+            <a:r>
+              <a:rPr lang="en-US" sz="6000" dirty="0"/>
+              <a:t>Now What?</a:t>
+            </a:r>
+          </a:p>
+        </p:txBody>
+      </p:sp>
+      <p:sp>
+        <p:nvSpPr>
+          <p:cNvPr id="14" name="Freeform: Shape 13">
+            <a:extLst>
+              <a:ext uri="{FF2B5EF4-FFF2-40B4-BE49-F238E27FC236}">
+                <a16:creationId xmlns:a16="http://schemas.microsoft.com/office/drawing/2014/main" id="{1DB7C82F-AB7E-4F0C-B829-FA1B9C415180}"/>
+              </a:ext>
+              <a:ext uri="{C183D7F6-B498-43B3-948B-1728B52AA6E4}">
+                <adec:decorative xmlns:adec="http://schemas.microsoft.com/office/drawing/2017/decorative" val="1"/>
+              </a:ext>
+            </a:extLst>
+          </p:cNvPr>
+          <p:cNvSpPr>
+            <a:spLocks noGrp="1" noRot="1" noChangeAspect="1" noMove="1" noResize="1" noEditPoints="1" noAdjustHandles="1" noChangeArrowheads="1" noChangeShapeType="1" noTextEdit="1"/>
+          </p:cNvSpPr>
+          <p:nvPr>
+            <p:extLst>
+              <p:ext uri="{386F3935-93C4-4BCD-93E2-E3B085C9AB24}">
+                <p16:designElem xmlns:p16="http://schemas.microsoft.com/office/powerpoint/2015/main" val="1"/>
+              </p:ext>
+            </p:extLst>
+          </p:nvPr>
+        </p:nvSpPr>
+        <p:spPr>
+          <a:xfrm flipH="1">
+            <a:off x="0" y="0"/>
+            <a:ext cx="6172782" cy="6858000"/>
+          </a:xfrm>
+          <a:custGeom>
+            <a:avLst/>
+            <a:gdLst>
+              <a:gd name="connsiteX0" fmla="*/ 6172782 w 6172782"/>
+              <a:gd name="connsiteY0" fmla="*/ 0 h 6858000"/>
+              <a:gd name="connsiteX1" fmla="*/ 69075 w 6172782"/>
+              <a:gd name="connsiteY1" fmla="*/ 0 h 6858000"/>
+              <a:gd name="connsiteX2" fmla="*/ 35131 w 6172782"/>
+              <a:gd name="connsiteY2" fmla="*/ 267128 h 6858000"/>
+              <a:gd name="connsiteX3" fmla="*/ 0 w 6172782"/>
+              <a:gd name="connsiteY3" fmla="*/ 962845 h 6858000"/>
+              <a:gd name="connsiteX4" fmla="*/ 3276103 w 6172782"/>
+              <a:gd name="connsiteY4" fmla="*/ 6782205 h 6858000"/>
+              <a:gd name="connsiteX5" fmla="*/ 3407923 w 6172782"/>
+              <a:gd name="connsiteY5" fmla="*/ 6858000 h 6858000"/>
+              <a:gd name="connsiteX6" fmla="*/ 6172782 w 6172782"/>
+              <a:gd name="connsiteY6" fmla="*/ 6858000 h 6858000"/>
+            </a:gdLst>
+            <a:ahLst/>
+            <a:cxnLst>
+              <a:cxn ang="0">
+                <a:pos x="connsiteX0" y="connsiteY0"/>
+              </a:cxn>
+              <a:cxn ang="0">
+                <a:pos x="connsiteX1" y="connsiteY1"/>
+              </a:cxn>
+              <a:cxn ang="0">
+                <a:pos x="connsiteX2" y="connsiteY2"/>
+              </a:cxn>
+              <a:cxn ang="0">
+                <a:pos x="connsiteX3" y="connsiteY3"/>
+              </a:cxn>
+              <a:cxn ang="0">
+                <a:pos x="connsiteX4" y="connsiteY4"/>
+              </a:cxn>
+              <a:cxn ang="0">
+                <a:pos x="connsiteX5" y="connsiteY5"/>
+              </a:cxn>
+              <a:cxn ang="0">
+                <a:pos x="connsiteX6" y="connsiteY6"/>
+              </a:cxn>
+            </a:cxnLst>
+            <a:rect l="l" t="t" r="r" b="b"/>
+            <a:pathLst>
+              <a:path w="6172782" h="6858000">
+                <a:moveTo>
+                  <a:pt x="6172782" y="0"/>
+                </a:moveTo>
+                <a:lnTo>
+                  <a:pt x="69075" y="0"/>
+                </a:lnTo>
+                <a:lnTo>
+                  <a:pt x="35131" y="267128"/>
+                </a:lnTo>
+                <a:cubicBezTo>
+                  <a:pt x="11901" y="495874"/>
+                  <a:pt x="0" y="727970"/>
+                  <a:pt x="0" y="962845"/>
+                </a:cubicBezTo>
+                <a:cubicBezTo>
+                  <a:pt x="0" y="3429034"/>
+                  <a:pt x="1312002" y="5588789"/>
+                  <a:pt x="3276103" y="6782205"/>
+                </a:cubicBezTo>
+                <a:lnTo>
+                  <a:pt x="3407923" y="6858000"/>
+                </a:lnTo>
+                <a:lnTo>
+                  <a:pt x="6172782" y="6858000"/>
+                </a:lnTo>
+                <a:close/>
+              </a:path>
+            </a:pathLst>
+          </a:custGeom>
+          <a:solidFill>
+            <a:srgbClr val="FFFFFF">
+              <a:alpha val="80000"/>
+            </a:srgbClr>
+          </a:solidFill>
+          <a:ln>
+            <a:noFill/>
+          </a:ln>
+        </p:spPr>
+        <p:style>
+          <a:lnRef idx="2">
+            <a:schemeClr val="accent1">
+              <a:shade val="50000"/>
+            </a:schemeClr>
+          </a:lnRef>
+          <a:fillRef idx="1">
+            <a:schemeClr val="accent1"/>
+          </a:fillRef>
+          <a:effectRef idx="0">
+            <a:schemeClr val="accent1"/>
+          </a:effectRef>
+          <a:fontRef idx="minor">
+            <a:schemeClr val="lt1"/>
+          </a:fontRef>
+        </p:style>
+        <p:txBody>
+          <a:bodyPr wrap="square" rtlCol="0" anchor="ctr">
+            <a:noAutofit/>
+          </a:bodyPr>
+          <a:lstStyle/>
+          <a:p>
+            <a:pPr marL="0" marR="0" lvl="0" indent="0" algn="ctr" defTabSz="914400" rtl="0" eaLnBrk="1" fontAlgn="auto" latinLnBrk="0" hangingPunct="1">
+              <a:lnSpc>
+                <a:spcPct val="100000"/>
+              </a:lnSpc>
+              <a:spcBef>
+                <a:spcPts val="0"/>
+              </a:spcBef>
+              <a:spcAft>
+                <a:spcPts val="0"/>
+              </a:spcAft>
+              <a:buClrTx/>
+              <a:buSzTx/>
+              <a:buFontTx/>
+              <a:buNone/>
+              <a:tabLst/>
+              <a:defRPr/>
+            </a:pPr>
+            <a:endParaRPr kumimoji="0" lang="en-US" sz="1800" b="0" i="0" u="none" strike="noStrike" kern="1200" cap="none" spc="0" normalizeH="0" baseline="0" noProof="0">
+              <a:ln>
+                <a:noFill/>
+              </a:ln>
+              <a:solidFill>
+                <a:prstClr val="white"/>
+              </a:solidFill>
+              <a:effectLst/>
+              <a:uLnTx/>
+              <a:uFillTx/>
+              <a:latin typeface="Calibri" panose="020F0502020204030204"/>
+              <a:ea typeface="+mn-ea"/>
+              <a:cs typeface="+mn-cs"/>
+            </a:endParaRPr>
+          </a:p>
+        </p:txBody>
+      </p:sp>
+      <p:pic>
+        <p:nvPicPr>
+          <p:cNvPr id="9" name="Content Placeholder 8">
+            <a:extLst>
+              <a:ext uri="{FF2B5EF4-FFF2-40B4-BE49-F238E27FC236}">
+                <a16:creationId xmlns:a16="http://schemas.microsoft.com/office/drawing/2014/main" id="{86B229AE-80C9-4323-9EE5-94D0DC5C0A5A}"/>
+              </a:ext>
+            </a:extLst>
+          </p:cNvPr>
+          <p:cNvPicPr>
+            <a:picLocks noGrp="1" noChangeAspect="1"/>
+          </p:cNvPicPr>
+          <p:nvPr>
+            <p:ph idx="1"/>
+          </p:nvPr>
+        </p:nvPicPr>
+        <p:blipFill rotWithShape="1">
+          <a:blip r:embed="rId2">
+            <a:extLst>
+              <a:ext uri="{28A0092B-C50C-407E-A947-70E740481C1C}">
+                <a14:useLocalDpi xmlns:a14="http://schemas.microsoft.com/office/drawing/2010/main" val="0"/>
+              </a:ext>
+            </a:extLst>
+          </a:blip>
+          <a:srcRect r="1" b="19458"/>
+          <a:stretch/>
+        </p:blipFill>
+        <p:spPr>
+          <a:xfrm>
+            <a:off x="20" y="10"/>
+            <a:ext cx="6024134" cy="6857990"/>
+          </a:xfrm>
+          <a:custGeom>
+            <a:avLst/>
+            <a:gdLst>
+              <a:gd name="connsiteX0" fmla="*/ 0 w 6024154"/>
+              <a:gd name="connsiteY0" fmla="*/ 0 h 6858000"/>
+              <a:gd name="connsiteX1" fmla="*/ 5953780 w 6024154"/>
+              <a:gd name="connsiteY1" fmla="*/ 0 h 6858000"/>
+              <a:gd name="connsiteX2" fmla="*/ 5989880 w 6024154"/>
+              <a:gd name="connsiteY2" fmla="*/ 284091 h 6858000"/>
+              <a:gd name="connsiteX3" fmla="*/ 6024154 w 6024154"/>
+              <a:gd name="connsiteY3" fmla="*/ 962844 h 6858000"/>
+              <a:gd name="connsiteX4" fmla="*/ 2549934 w 6024154"/>
+              <a:gd name="connsiteY4" fmla="*/ 6800152 h 6858000"/>
+              <a:gd name="connsiteX5" fmla="*/ 2436987 w 6024154"/>
+              <a:gd name="connsiteY5" fmla="*/ 6858000 h 6858000"/>
+              <a:gd name="connsiteX6" fmla="*/ 0 w 6024154"/>
+              <a:gd name="connsiteY6" fmla="*/ 6858000 h 6858000"/>
+            </a:gdLst>
+            <a:ahLst/>
+            <a:cxnLst>
+              <a:cxn ang="0">
+                <a:pos x="connsiteX0" y="connsiteY0"/>
+              </a:cxn>
+              <a:cxn ang="0">
+                <a:pos x="connsiteX1" y="connsiteY1"/>
+              </a:cxn>
+              <a:cxn ang="0">
+                <a:pos x="connsiteX2" y="connsiteY2"/>
+              </a:cxn>
+              <a:cxn ang="0">
+                <a:pos x="connsiteX3" y="connsiteY3"/>
+              </a:cxn>
+              <a:cxn ang="0">
+                <a:pos x="connsiteX4" y="connsiteY4"/>
+              </a:cxn>
+              <a:cxn ang="0">
+                <a:pos x="connsiteX5" y="connsiteY5"/>
+              </a:cxn>
+              <a:cxn ang="0">
+                <a:pos x="connsiteX6" y="connsiteY6"/>
+              </a:cxn>
+            </a:cxnLst>
+            <a:rect l="l" t="t" r="r" b="b"/>
+            <a:pathLst>
+              <a:path w="6024154" h="6858000">
+                <a:moveTo>
+                  <a:pt x="0" y="0"/>
+                </a:moveTo>
+                <a:lnTo>
+                  <a:pt x="5953780" y="0"/>
+                </a:lnTo>
+                <a:lnTo>
+                  <a:pt x="5989880" y="284091"/>
+                </a:lnTo>
+                <a:cubicBezTo>
+                  <a:pt x="6012544" y="507260"/>
+                  <a:pt x="6024154" y="733696"/>
+                  <a:pt x="6024154" y="962844"/>
+                </a:cubicBezTo>
+                <a:cubicBezTo>
+                  <a:pt x="6024154" y="3483472"/>
+                  <a:pt x="4619336" y="5675986"/>
+                  <a:pt x="2549934" y="6800152"/>
+                </a:cubicBezTo>
+                <a:lnTo>
+                  <a:pt x="2436987" y="6858000"/>
+                </a:lnTo>
+                <a:lnTo>
+                  <a:pt x="0" y="6858000"/>
+                </a:lnTo>
+                <a:close/>
+              </a:path>
+            </a:pathLst>
+          </a:custGeom>
+        </p:spPr>
+      </p:pic>
+    </p:spTree>
+    <p:extLst>
+      <p:ext uri="{BB962C8B-B14F-4D97-AF65-F5344CB8AC3E}">
+        <p14:creationId xmlns:p14="http://schemas.microsoft.com/office/powerpoint/2010/main" val="4253113840"/>
+      </p:ext>
+    </p:extLst>
+  </p:cSld>
+  <p:clrMapOvr>
+    <a:overrideClrMapping bg1="dk1" tx1="lt1" bg2="dk2" tx2="lt2" accent1="accent1" accent2="accent2" accent3="accent3" accent4="accent4" accent5="accent5" accent6="accent6" hlink="hlink" folHlink="folHlink"/>
+  </p:clrMapOvr>
+</p:sld>
+</file>
+
+<file path=ppt/slides/slide11.xml><?xml version="1.0" encoding="utf-8"?>
+<p:sld xmlns:a="http://schemas.openxmlformats.org/drawingml/2006/main" xmlns:r="http://schemas.openxmlformats.org/officeDocument/2006/relationships" xmlns:p="http://schemas.openxmlformats.org/presentationml/2006/main">
+  <p:cSld>
+    <p:bg>
+      <p:bgPr>
+        <a:solidFill>
           <a:schemeClr val="bg1"/>
         </a:solidFill>
         <a:effectLst/>
@@ -12381,7 +12733,7 @@
 </p:sld>
 </file>
 
-<file path=ppt/slides/slide11.xml><?xml version="1.0" encoding="utf-8"?>
+<file path=ppt/slides/slide12.xml><?xml version="1.0" encoding="utf-8"?>
 <p:sld xmlns:a="http://schemas.openxmlformats.org/drawingml/2006/main" xmlns:r="http://schemas.openxmlformats.org/officeDocument/2006/relationships" xmlns:p="http://schemas.openxmlformats.org/presentationml/2006/main">
   <p:cSld>
     <p:bg>
@@ -12672,7 +13024,7 @@
 </p:sld>
 </file>
 
-<file path=ppt/slides/slide12.xml><?xml version="1.0" encoding="utf-8"?>
+<file path=ppt/slides/slide13.xml><?xml version="1.0" encoding="utf-8"?>
 <p:sld xmlns:a="http://schemas.openxmlformats.org/drawingml/2006/main" xmlns:r="http://schemas.openxmlformats.org/officeDocument/2006/relationships" xmlns:p="http://schemas.openxmlformats.org/presentationml/2006/main">
   <p:cSld>
     <p:bg>
@@ -14878,6 +15230,14 @@
 <file path=ppt/slides/slide5.xml><?xml version="1.0" encoding="utf-8"?>
 <p:sld xmlns:a="http://schemas.openxmlformats.org/drawingml/2006/main" xmlns:r="http://schemas.openxmlformats.org/officeDocument/2006/relationships" xmlns:p="http://schemas.openxmlformats.org/presentationml/2006/main">
   <p:cSld>
+    <p:bg>
+      <p:bgPr>
+        <a:solidFill>
+          <a:schemeClr val="bg1"/>
+        </a:solidFill>
+        <a:effectLst/>
+      </p:bgPr>
+    </p:bg>
     <p:spTree>
       <p:nvGrpSpPr>
         <p:cNvPr id="1" name=""/>
@@ -14908,14 +15268,21 @@
             <p:ph type="title"/>
           </p:nvPr>
         </p:nvSpPr>
-        <p:spPr/>
+        <p:spPr>
+          <a:xfrm>
+            <a:off x="648929" y="629266"/>
+            <a:ext cx="5127031" cy="1676603"/>
+          </a:xfrm>
+        </p:spPr>
         <p:txBody>
-          <a:bodyPr/>
+          <a:bodyPr>
+            <a:normAutofit/>
+          </a:bodyPr>
           <a:lstStyle/>
           <a:p>
             <a:r>
               <a:rPr lang="en-US" dirty="0"/>
-              <a:t>What Kubernetes Does</a:t>
+              <a:t>What Kubernetes Does (1 of 2)</a:t>
             </a:r>
           </a:p>
         </p:txBody>
@@ -14936,57 +15303,64 @@
             <p:ph idx="1"/>
           </p:nvPr>
         </p:nvSpPr>
-        <p:spPr/>
+        <p:spPr>
+          <a:xfrm>
+            <a:off x="648930" y="2438400"/>
+            <a:ext cx="5127029" cy="3785419"/>
+          </a:xfrm>
+        </p:spPr>
         <p:txBody>
-          <a:bodyPr/>
+          <a:bodyPr>
+            <a:normAutofit/>
+          </a:bodyPr>
           <a:lstStyle/>
           <a:p>
             <a:r>
-              <a:rPr lang="en-US" dirty="0"/>
+              <a:rPr lang="en-US" sz="2000" dirty="0"/>
               <a:t>Provides management of container deployments</a:t>
             </a:r>
           </a:p>
           <a:p>
             <a:r>
-              <a:rPr lang="en-US" dirty="0"/>
-              <a:t>Places containers into </a:t>
-            </a:r>
-            <a:r>
-              <a:rPr lang="en-US" b="1" i="1" dirty="0"/>
-              <a:t>Pods</a:t>
-            </a:r>
-            <a:r>
-              <a:rPr lang="en-US" dirty="0"/>
-              <a:t> which get placed onto the appropriate </a:t>
-            </a:r>
-            <a:r>
-              <a:rPr lang="en-US" b="1" i="1" dirty="0"/>
-              <a:t>Worker Nodes</a:t>
-            </a:r>
-          </a:p>
-          <a:p>
-            <a:r>
-              <a:rPr lang="en-US" dirty="0"/>
+              <a:rPr lang="en-US" sz="2000" dirty="0"/>
               <a:t>Provides a communication mechanism for the pods to talk to each other</a:t>
             </a:r>
           </a:p>
           <a:p>
-            <a:r>
-              <a:rPr lang="en-US" dirty="0"/>
-              <a:t>Monitors pods and replaces them upon failure</a:t>
-            </a:r>
-          </a:p>
-          <a:p>
-            <a:r>
-              <a:rPr lang="en-US" dirty="0"/>
-              <a:t>Provides mechanisms for rolling pod upgrades to minimize downtime and for rollbacks upon failures</a:t>
-            </a:r>
-          </a:p>
-          <a:p>
-            <a:endParaRPr lang="en-US" dirty="0"/>
+            <a:endParaRPr lang="en-US" sz="2000" dirty="0"/>
           </a:p>
         </p:txBody>
       </p:sp>
+      <p:pic>
+        <p:nvPicPr>
+          <p:cNvPr id="4" name="Picture 3">
+            <a:extLst>
+              <a:ext uri="{FF2B5EF4-FFF2-40B4-BE49-F238E27FC236}">
+                <a16:creationId xmlns:a16="http://schemas.microsoft.com/office/drawing/2014/main" id="{3CB0F577-41AD-4BBB-A35D-0B5344ED3C72}"/>
+              </a:ext>
+            </a:extLst>
+          </p:cNvPr>
+          <p:cNvPicPr>
+            <a:picLocks noChangeAspect="1"/>
+          </p:cNvPicPr>
+          <p:nvPr/>
+        </p:nvPicPr>
+        <p:blipFill rotWithShape="1">
+          <a:blip r:embed="rId2"/>
+          <a:srcRect b="4349"/>
+          <a:stretch/>
+        </p:blipFill>
+        <p:spPr>
+          <a:xfrm>
+            <a:off x="6090612" y="10"/>
+            <a:ext cx="6101387" cy="6857990"/>
+          </a:xfrm>
+          <a:prstGeom prst="rect">
+            <a:avLst/>
+          </a:prstGeom>
+          <a:effectLst/>
+        </p:spPr>
+      </p:pic>
     </p:spTree>
     <p:extLst>
       <p:ext uri="{BB962C8B-B14F-4D97-AF65-F5344CB8AC3E}">
@@ -15001,6 +15375,230 @@
 </file>
 
 <file path=ppt/slides/slide6.xml><?xml version="1.0" encoding="utf-8"?>
+<p:sld xmlns:a="http://schemas.openxmlformats.org/drawingml/2006/main" xmlns:r="http://schemas.openxmlformats.org/officeDocument/2006/relationships" xmlns:p="http://schemas.openxmlformats.org/presentationml/2006/main">
+  <p:cSld>
+    <p:bg>
+      <p:bgPr>
+        <a:solidFill>
+          <a:schemeClr val="bg1"/>
+        </a:solidFill>
+        <a:effectLst/>
+      </p:bgPr>
+    </p:bg>
+    <p:spTree>
+      <p:nvGrpSpPr>
+        <p:cNvPr id="1" name=""/>
+        <p:cNvGrpSpPr/>
+        <p:nvPr/>
+      </p:nvGrpSpPr>
+      <p:grpSpPr>
+        <a:xfrm>
+          <a:off x="0" y="0"/>
+          <a:ext cx="0" cy="0"/>
+          <a:chOff x="0" y="0"/>
+          <a:chExt cx="0" cy="0"/>
+        </a:xfrm>
+      </p:grpSpPr>
+      <p:sp>
+        <p:nvSpPr>
+          <p:cNvPr id="2" name="Title 1">
+            <a:extLst>
+              <a:ext uri="{FF2B5EF4-FFF2-40B4-BE49-F238E27FC236}">
+                <a16:creationId xmlns:a16="http://schemas.microsoft.com/office/drawing/2014/main" id="{0058170F-4D5A-4838-A138-9734173FAA21}"/>
+              </a:ext>
+            </a:extLst>
+          </p:cNvPr>
+          <p:cNvSpPr>
+            <a:spLocks noGrp="1"/>
+          </p:cNvSpPr>
+          <p:nvPr>
+            <p:ph type="title"/>
+          </p:nvPr>
+        </p:nvSpPr>
+        <p:spPr>
+          <a:xfrm>
+            <a:off x="960100" y="978102"/>
+            <a:ext cx="10588434" cy="1062644"/>
+          </a:xfrm>
+        </p:spPr>
+        <p:txBody>
+          <a:bodyPr anchor="b">
+            <a:normAutofit/>
+          </a:bodyPr>
+          <a:lstStyle/>
+          <a:p>
+            <a:r>
+              <a:rPr lang="en-US"/>
+              <a:t>What Kubernetes Does (2 of 2)</a:t>
+            </a:r>
+            <a:endParaRPr lang="en-US" dirty="0"/>
+          </a:p>
+        </p:txBody>
+      </p:sp>
+      <p:cxnSp>
+        <p:nvCxnSpPr>
+          <p:cNvPr id="15" name="Straight Connector 8">
+            <a:extLst>
+              <a:ext uri="{FF2B5EF4-FFF2-40B4-BE49-F238E27FC236}">
+                <a16:creationId xmlns:a16="http://schemas.microsoft.com/office/drawing/2014/main" id="{39B7FDC9-F0CE-43A7-9F2A-83DD09DC3453}"/>
+              </a:ext>
+              <a:ext uri="{C183D7F6-B498-43B3-948B-1728B52AA6E4}">
+                <adec:decorative xmlns:adec="http://schemas.microsoft.com/office/drawing/2017/decorative" val="1"/>
+              </a:ext>
+            </a:extLst>
+          </p:cNvPr>
+          <p:cNvCxnSpPr>
+            <a:cxnSpLocks noGrp="1" noRot="1" noChangeAspect="1" noMove="1" noResize="1" noEditPoints="1" noAdjustHandles="1" noChangeArrowheads="1" noChangeShapeType="1"/>
+          </p:cNvCxnSpPr>
+          <p:nvPr>
+            <p:extLst>
+              <p:ext uri="{386F3935-93C4-4BCD-93E2-E3B085C9AB24}">
+                <p16:designElem xmlns:p16="http://schemas.microsoft.com/office/powerpoint/2015/main" val="1"/>
+              </p:ext>
+            </p:extLst>
+          </p:nvPr>
+        </p:nvCxnSpPr>
+        <p:spPr>
+          <a:xfrm>
+            <a:off x="1047624" y="2265037"/>
+            <a:ext cx="10125012" cy="0"/>
+          </a:xfrm>
+          <a:prstGeom prst="line">
+            <a:avLst/>
+          </a:prstGeom>
+          <a:ln w="15875">
+            <a:solidFill>
+              <a:schemeClr val="tx1">
+                <a:lumMod val="65000"/>
+                <a:lumOff val="35000"/>
+              </a:schemeClr>
+            </a:solidFill>
+          </a:ln>
+        </p:spPr>
+        <p:style>
+          <a:lnRef idx="1">
+            <a:schemeClr val="accent1"/>
+          </a:lnRef>
+          <a:fillRef idx="0">
+            <a:schemeClr val="accent1"/>
+          </a:fillRef>
+          <a:effectRef idx="0">
+            <a:schemeClr val="accent1"/>
+          </a:effectRef>
+          <a:fontRef idx="minor">
+            <a:schemeClr val="tx1"/>
+          </a:fontRef>
+        </p:style>
+      </p:cxnSp>
+      <p:pic>
+        <p:nvPicPr>
+          <p:cNvPr id="4" name="Picture 3">
+            <a:extLst>
+              <a:ext uri="{FF2B5EF4-FFF2-40B4-BE49-F238E27FC236}">
+                <a16:creationId xmlns:a16="http://schemas.microsoft.com/office/drawing/2014/main" id="{F82A105A-A8E0-44AE-AF4C-0814E01DD9CA}"/>
+              </a:ext>
+            </a:extLst>
+          </p:cNvPr>
+          <p:cNvPicPr>
+            <a:picLocks noChangeAspect="1"/>
+          </p:cNvPicPr>
+          <p:nvPr/>
+        </p:nvPicPr>
+        <p:blipFill>
+          <a:blip r:embed="rId2"/>
+          <a:stretch>
+            <a:fillRect/>
+          </a:stretch>
+        </p:blipFill>
+        <p:spPr>
+          <a:xfrm>
+            <a:off x="1114023" y="2811104"/>
+            <a:ext cx="3366480" cy="2880540"/>
+          </a:xfrm>
+          <a:prstGeom prst="rect">
+            <a:avLst/>
+          </a:prstGeom>
+        </p:spPr>
+      </p:pic>
+      <p:sp>
+        <p:nvSpPr>
+          <p:cNvPr id="3" name="Content Placeholder 2">
+            <a:extLst>
+              <a:ext uri="{FF2B5EF4-FFF2-40B4-BE49-F238E27FC236}">
+                <a16:creationId xmlns:a16="http://schemas.microsoft.com/office/drawing/2014/main" id="{577AC1DB-3130-4129-BB88-E95A4EB06902}"/>
+              </a:ext>
+            </a:extLst>
+          </p:cNvPr>
+          <p:cNvSpPr>
+            <a:spLocks noGrp="1"/>
+          </p:cNvSpPr>
+          <p:nvPr>
+            <p:ph idx="1"/>
+          </p:nvPr>
+        </p:nvSpPr>
+        <p:spPr>
+          <a:xfrm>
+            <a:off x="4955354" y="2682433"/>
+            <a:ext cx="6282169" cy="3215749"/>
+          </a:xfrm>
+        </p:spPr>
+        <p:txBody>
+          <a:bodyPr>
+            <a:normAutofit/>
+          </a:bodyPr>
+          <a:lstStyle/>
+          <a:p>
+            <a:r>
+              <a:rPr lang="en-US" sz="2400"/>
+              <a:t>Places containers into </a:t>
+            </a:r>
+            <a:r>
+              <a:rPr lang="en-US" sz="2400" b="1" i="1"/>
+              <a:t>Pods</a:t>
+            </a:r>
+            <a:r>
+              <a:rPr lang="en-US" sz="2400"/>
+              <a:t> which get placed onto the appropriate </a:t>
+            </a:r>
+            <a:r>
+              <a:rPr lang="en-US" sz="2400" b="1" i="1"/>
+              <a:t>Worker Nodes</a:t>
+            </a:r>
+          </a:p>
+          <a:p>
+            <a:r>
+              <a:rPr lang="en-US" sz="2400"/>
+              <a:t>Monitors pods and replaces them upon failure</a:t>
+            </a:r>
+          </a:p>
+          <a:p>
+            <a:r>
+              <a:rPr lang="en-US" sz="2400"/>
+              <a:t>Provides mechanisms for rolling pod upgrades to minimize downtime and for rollbacks upon failures</a:t>
+            </a:r>
+          </a:p>
+          <a:p>
+            <a:endParaRPr lang="en-US" sz="2400" b="1" i="1"/>
+          </a:p>
+          <a:p>
+            <a:endParaRPr lang="en-US" sz="2400"/>
+          </a:p>
+        </p:txBody>
+      </p:sp>
+    </p:spTree>
+    <p:extLst>
+      <p:ext uri="{BB962C8B-B14F-4D97-AF65-F5344CB8AC3E}">
+        <p14:creationId xmlns:p14="http://schemas.microsoft.com/office/powerpoint/2010/main" val="2321922204"/>
+      </p:ext>
+    </p:extLst>
+  </p:cSld>
+  <p:clrMapOvr>
+    <a:masterClrMapping/>
+  </p:clrMapOvr>
+</p:sld>
+</file>
+
+<file path=ppt/slides/slide7.xml><?xml version="1.0" encoding="utf-8"?>
 <p:sld xmlns:a="http://schemas.openxmlformats.org/drawingml/2006/main" xmlns:r="http://schemas.openxmlformats.org/officeDocument/2006/relationships" xmlns:p="http://schemas.openxmlformats.org/presentationml/2006/main">
   <p:cSld>
     <p:bg>
@@ -15404,7 +16002,7 @@
 </p:sld>
 </file>
 
-<file path=ppt/slides/slide7.xml><?xml version="1.0" encoding="utf-8"?>
+<file path=ppt/slides/slide8.xml><?xml version="1.0" encoding="utf-8"?>
 <p:sld xmlns:a="http://schemas.openxmlformats.org/drawingml/2006/main" xmlns:r="http://schemas.openxmlformats.org/officeDocument/2006/relationships" xmlns:p="http://schemas.openxmlformats.org/presentationml/2006/main">
   <p:cSld>
     <p:spTree>
@@ -15658,7 +16256,7 @@
 </p:sld>
 </file>
 
-<file path=ppt/slides/slide8.xml><?xml version="1.0" encoding="utf-8"?>
+<file path=ppt/slides/slide9.xml><?xml version="1.0" encoding="utf-8"?>
 <p:sld xmlns:a="http://schemas.openxmlformats.org/drawingml/2006/main" xmlns:r="http://schemas.openxmlformats.org/officeDocument/2006/relationships" xmlns:p="http://schemas.openxmlformats.org/presentationml/2006/main">
   <p:cSld>
     <p:bg>
@@ -16061,357 +16659,6 @@
   </p:cSld>
   <p:clrMapOvr>
     <a:masterClrMapping/>
-  </p:clrMapOvr>
-</p:sld>
-</file>
-
-<file path=ppt/slides/slide9.xml><?xml version="1.0" encoding="utf-8"?>
-<p:sld xmlns:a="http://schemas.openxmlformats.org/drawingml/2006/main" xmlns:r="http://schemas.openxmlformats.org/officeDocument/2006/relationships" xmlns:p="http://schemas.openxmlformats.org/presentationml/2006/main">
-  <p:cSld>
-    <p:bg>
-      <p:bgPr>
-        <a:solidFill>
-          <a:schemeClr val="bg1">
-            <a:tint val="95000"/>
-            <a:satMod val="170000"/>
-          </a:schemeClr>
-        </a:solidFill>
-        <a:effectLst/>
-      </p:bgPr>
-    </p:bg>
-    <p:spTree>
-      <p:nvGrpSpPr>
-        <p:cNvPr id="1" name=""/>
-        <p:cNvGrpSpPr/>
-        <p:nvPr/>
-      </p:nvGrpSpPr>
-      <p:grpSpPr>
-        <a:xfrm>
-          <a:off x="0" y="0"/>
-          <a:ext cx="0" cy="0"/>
-          <a:chOff x="0" y="0"/>
-          <a:chExt cx="0" cy="0"/>
-        </a:xfrm>
-      </p:grpSpPr>
-      <p:sp>
-        <p:nvSpPr>
-          <p:cNvPr id="2" name="Title 1">
-            <a:extLst>
-              <a:ext uri="{FF2B5EF4-FFF2-40B4-BE49-F238E27FC236}">
-                <a16:creationId xmlns:a16="http://schemas.microsoft.com/office/drawing/2014/main" id="{E32B1E46-F181-4C14-89B8-14D0DC17B5E0}"/>
-              </a:ext>
-            </a:extLst>
-          </p:cNvPr>
-          <p:cNvSpPr>
-            <a:spLocks noGrp="1"/>
-          </p:cNvSpPr>
-          <p:nvPr>
-            <p:ph type="title"/>
-          </p:nvPr>
-        </p:nvSpPr>
-        <p:spPr>
-          <a:xfrm>
-            <a:off x="6746628" y="1783959"/>
-            <a:ext cx="4645250" cy="2889114"/>
-          </a:xfrm>
-        </p:spPr>
-        <p:txBody>
-          <a:bodyPr vert="horz" lIns="91440" tIns="45720" rIns="91440" bIns="45720" rtlCol="0" anchor="b">
-            <a:normAutofit/>
-          </a:bodyPr>
-          <a:lstStyle/>
-          <a:p>
-            <a:r>
-              <a:rPr lang="en-US" sz="6000" dirty="0"/>
-              <a:t>Now What?</a:t>
-            </a:r>
-          </a:p>
-        </p:txBody>
-      </p:sp>
-      <p:sp>
-        <p:nvSpPr>
-          <p:cNvPr id="14" name="Freeform: Shape 13">
-            <a:extLst>
-              <a:ext uri="{FF2B5EF4-FFF2-40B4-BE49-F238E27FC236}">
-                <a16:creationId xmlns:a16="http://schemas.microsoft.com/office/drawing/2014/main" id="{1DB7C82F-AB7E-4F0C-B829-FA1B9C415180}"/>
-              </a:ext>
-              <a:ext uri="{C183D7F6-B498-43B3-948B-1728B52AA6E4}">
-                <adec:decorative xmlns:adec="http://schemas.microsoft.com/office/drawing/2017/decorative" val="1"/>
-              </a:ext>
-            </a:extLst>
-          </p:cNvPr>
-          <p:cNvSpPr>
-            <a:spLocks noGrp="1" noRot="1" noChangeAspect="1" noMove="1" noResize="1" noEditPoints="1" noAdjustHandles="1" noChangeArrowheads="1" noChangeShapeType="1" noTextEdit="1"/>
-          </p:cNvSpPr>
-          <p:nvPr>
-            <p:extLst>
-              <p:ext uri="{386F3935-93C4-4BCD-93E2-E3B085C9AB24}">
-                <p16:designElem xmlns:p16="http://schemas.microsoft.com/office/powerpoint/2015/main" val="1"/>
-              </p:ext>
-            </p:extLst>
-          </p:nvPr>
-        </p:nvSpPr>
-        <p:spPr>
-          <a:xfrm flipH="1">
-            <a:off x="0" y="0"/>
-            <a:ext cx="6172782" cy="6858000"/>
-          </a:xfrm>
-          <a:custGeom>
-            <a:avLst/>
-            <a:gdLst>
-              <a:gd name="connsiteX0" fmla="*/ 6172782 w 6172782"/>
-              <a:gd name="connsiteY0" fmla="*/ 0 h 6858000"/>
-              <a:gd name="connsiteX1" fmla="*/ 69075 w 6172782"/>
-              <a:gd name="connsiteY1" fmla="*/ 0 h 6858000"/>
-              <a:gd name="connsiteX2" fmla="*/ 35131 w 6172782"/>
-              <a:gd name="connsiteY2" fmla="*/ 267128 h 6858000"/>
-              <a:gd name="connsiteX3" fmla="*/ 0 w 6172782"/>
-              <a:gd name="connsiteY3" fmla="*/ 962845 h 6858000"/>
-              <a:gd name="connsiteX4" fmla="*/ 3276103 w 6172782"/>
-              <a:gd name="connsiteY4" fmla="*/ 6782205 h 6858000"/>
-              <a:gd name="connsiteX5" fmla="*/ 3407923 w 6172782"/>
-              <a:gd name="connsiteY5" fmla="*/ 6858000 h 6858000"/>
-              <a:gd name="connsiteX6" fmla="*/ 6172782 w 6172782"/>
-              <a:gd name="connsiteY6" fmla="*/ 6858000 h 6858000"/>
-            </a:gdLst>
-            <a:ahLst/>
-            <a:cxnLst>
-              <a:cxn ang="0">
-                <a:pos x="connsiteX0" y="connsiteY0"/>
-              </a:cxn>
-              <a:cxn ang="0">
-                <a:pos x="connsiteX1" y="connsiteY1"/>
-              </a:cxn>
-              <a:cxn ang="0">
-                <a:pos x="connsiteX2" y="connsiteY2"/>
-              </a:cxn>
-              <a:cxn ang="0">
-                <a:pos x="connsiteX3" y="connsiteY3"/>
-              </a:cxn>
-              <a:cxn ang="0">
-                <a:pos x="connsiteX4" y="connsiteY4"/>
-              </a:cxn>
-              <a:cxn ang="0">
-                <a:pos x="connsiteX5" y="connsiteY5"/>
-              </a:cxn>
-              <a:cxn ang="0">
-                <a:pos x="connsiteX6" y="connsiteY6"/>
-              </a:cxn>
-            </a:cxnLst>
-            <a:rect l="l" t="t" r="r" b="b"/>
-            <a:pathLst>
-              <a:path w="6172782" h="6858000">
-                <a:moveTo>
-                  <a:pt x="6172782" y="0"/>
-                </a:moveTo>
-                <a:lnTo>
-                  <a:pt x="69075" y="0"/>
-                </a:lnTo>
-                <a:lnTo>
-                  <a:pt x="35131" y="267128"/>
-                </a:lnTo>
-                <a:cubicBezTo>
-                  <a:pt x="11901" y="495874"/>
-                  <a:pt x="0" y="727970"/>
-                  <a:pt x="0" y="962845"/>
-                </a:cubicBezTo>
-                <a:cubicBezTo>
-                  <a:pt x="0" y="3429034"/>
-                  <a:pt x="1312002" y="5588789"/>
-                  <a:pt x="3276103" y="6782205"/>
-                </a:cubicBezTo>
-                <a:lnTo>
-                  <a:pt x="3407923" y="6858000"/>
-                </a:lnTo>
-                <a:lnTo>
-                  <a:pt x="6172782" y="6858000"/>
-                </a:lnTo>
-                <a:close/>
-              </a:path>
-            </a:pathLst>
-          </a:custGeom>
-          <a:solidFill>
-            <a:srgbClr val="FFFFFF">
-              <a:alpha val="80000"/>
-            </a:srgbClr>
-          </a:solidFill>
-          <a:ln>
-            <a:noFill/>
-          </a:ln>
-        </p:spPr>
-        <p:style>
-          <a:lnRef idx="2">
-            <a:schemeClr val="accent1">
-              <a:shade val="50000"/>
-            </a:schemeClr>
-          </a:lnRef>
-          <a:fillRef idx="1">
-            <a:schemeClr val="accent1"/>
-          </a:fillRef>
-          <a:effectRef idx="0">
-            <a:schemeClr val="accent1"/>
-          </a:effectRef>
-          <a:fontRef idx="minor">
-            <a:schemeClr val="lt1"/>
-          </a:fontRef>
-        </p:style>
-        <p:txBody>
-          <a:bodyPr wrap="square" rtlCol="0" anchor="ctr">
-            <a:noAutofit/>
-          </a:bodyPr>
-          <a:lstStyle/>
-          <a:p>
-            <a:pPr marL="0" marR="0" lvl="0" indent="0" algn="ctr" defTabSz="914400" rtl="0" eaLnBrk="1" fontAlgn="auto" latinLnBrk="0" hangingPunct="1">
-              <a:lnSpc>
-                <a:spcPct val="100000"/>
-              </a:lnSpc>
-              <a:spcBef>
-                <a:spcPts val="0"/>
-              </a:spcBef>
-              <a:spcAft>
-                <a:spcPts val="0"/>
-              </a:spcAft>
-              <a:buClrTx/>
-              <a:buSzTx/>
-              <a:buFontTx/>
-              <a:buNone/>
-              <a:tabLst/>
-              <a:defRPr/>
-            </a:pPr>
-            <a:endParaRPr kumimoji="0" lang="en-US" sz="1800" b="0" i="0" u="none" strike="noStrike" kern="1200" cap="none" spc="0" normalizeH="0" baseline="0" noProof="0">
-              <a:ln>
-                <a:noFill/>
-              </a:ln>
-              <a:solidFill>
-                <a:prstClr val="white"/>
-              </a:solidFill>
-              <a:effectLst/>
-              <a:uLnTx/>
-              <a:uFillTx/>
-              <a:latin typeface="Calibri" panose="020F0502020204030204"/>
-              <a:ea typeface="+mn-ea"/>
-              <a:cs typeface="+mn-cs"/>
-            </a:endParaRPr>
-          </a:p>
-        </p:txBody>
-      </p:sp>
-      <p:pic>
-        <p:nvPicPr>
-          <p:cNvPr id="9" name="Content Placeholder 8">
-            <a:extLst>
-              <a:ext uri="{FF2B5EF4-FFF2-40B4-BE49-F238E27FC236}">
-                <a16:creationId xmlns:a16="http://schemas.microsoft.com/office/drawing/2014/main" id="{86B229AE-80C9-4323-9EE5-94D0DC5C0A5A}"/>
-              </a:ext>
-            </a:extLst>
-          </p:cNvPr>
-          <p:cNvPicPr>
-            <a:picLocks noGrp="1" noChangeAspect="1"/>
-          </p:cNvPicPr>
-          <p:nvPr>
-            <p:ph idx="1"/>
-          </p:nvPr>
-        </p:nvPicPr>
-        <p:blipFill rotWithShape="1">
-          <a:blip r:embed="rId2">
-            <a:extLst>
-              <a:ext uri="{28A0092B-C50C-407E-A947-70E740481C1C}">
-                <a14:useLocalDpi xmlns:a14="http://schemas.microsoft.com/office/drawing/2010/main" val="0"/>
-              </a:ext>
-            </a:extLst>
-          </a:blip>
-          <a:srcRect r="1" b="19458"/>
-          <a:stretch/>
-        </p:blipFill>
-        <p:spPr>
-          <a:xfrm>
-            <a:off x="20" y="10"/>
-            <a:ext cx="6024134" cy="6857990"/>
-          </a:xfrm>
-          <a:custGeom>
-            <a:avLst/>
-            <a:gdLst>
-              <a:gd name="connsiteX0" fmla="*/ 0 w 6024154"/>
-              <a:gd name="connsiteY0" fmla="*/ 0 h 6858000"/>
-              <a:gd name="connsiteX1" fmla="*/ 5953780 w 6024154"/>
-              <a:gd name="connsiteY1" fmla="*/ 0 h 6858000"/>
-              <a:gd name="connsiteX2" fmla="*/ 5989880 w 6024154"/>
-              <a:gd name="connsiteY2" fmla="*/ 284091 h 6858000"/>
-              <a:gd name="connsiteX3" fmla="*/ 6024154 w 6024154"/>
-              <a:gd name="connsiteY3" fmla="*/ 962844 h 6858000"/>
-              <a:gd name="connsiteX4" fmla="*/ 2549934 w 6024154"/>
-              <a:gd name="connsiteY4" fmla="*/ 6800152 h 6858000"/>
-              <a:gd name="connsiteX5" fmla="*/ 2436987 w 6024154"/>
-              <a:gd name="connsiteY5" fmla="*/ 6858000 h 6858000"/>
-              <a:gd name="connsiteX6" fmla="*/ 0 w 6024154"/>
-              <a:gd name="connsiteY6" fmla="*/ 6858000 h 6858000"/>
-            </a:gdLst>
-            <a:ahLst/>
-            <a:cxnLst>
-              <a:cxn ang="0">
-                <a:pos x="connsiteX0" y="connsiteY0"/>
-              </a:cxn>
-              <a:cxn ang="0">
-                <a:pos x="connsiteX1" y="connsiteY1"/>
-              </a:cxn>
-              <a:cxn ang="0">
-                <a:pos x="connsiteX2" y="connsiteY2"/>
-              </a:cxn>
-              <a:cxn ang="0">
-                <a:pos x="connsiteX3" y="connsiteY3"/>
-              </a:cxn>
-              <a:cxn ang="0">
-                <a:pos x="connsiteX4" y="connsiteY4"/>
-              </a:cxn>
-              <a:cxn ang="0">
-                <a:pos x="connsiteX5" y="connsiteY5"/>
-              </a:cxn>
-              <a:cxn ang="0">
-                <a:pos x="connsiteX6" y="connsiteY6"/>
-              </a:cxn>
-            </a:cxnLst>
-            <a:rect l="l" t="t" r="r" b="b"/>
-            <a:pathLst>
-              <a:path w="6024154" h="6858000">
-                <a:moveTo>
-                  <a:pt x="0" y="0"/>
-                </a:moveTo>
-                <a:lnTo>
-                  <a:pt x="5953780" y="0"/>
-                </a:lnTo>
-                <a:lnTo>
-                  <a:pt x="5989880" y="284091"/>
-                </a:lnTo>
-                <a:cubicBezTo>
-                  <a:pt x="6012544" y="507260"/>
-                  <a:pt x="6024154" y="733696"/>
-                  <a:pt x="6024154" y="962844"/>
-                </a:cubicBezTo>
-                <a:cubicBezTo>
-                  <a:pt x="6024154" y="3483472"/>
-                  <a:pt x="4619336" y="5675986"/>
-                  <a:pt x="2549934" y="6800152"/>
-                </a:cubicBezTo>
-                <a:lnTo>
-                  <a:pt x="2436987" y="6858000"/>
-                </a:lnTo>
-                <a:lnTo>
-                  <a:pt x="0" y="6858000"/>
-                </a:lnTo>
-                <a:close/>
-              </a:path>
-            </a:pathLst>
-          </a:custGeom>
-        </p:spPr>
-      </p:pic>
-    </p:spTree>
-    <p:extLst>
-      <p:ext uri="{BB962C8B-B14F-4D97-AF65-F5344CB8AC3E}">
-        <p14:creationId xmlns:p14="http://schemas.microsoft.com/office/powerpoint/2010/main" val="4253113840"/>
-      </p:ext>
-    </p:extLst>
-  </p:cSld>
-  <p:clrMapOvr>
-    <a:overrideClrMapping bg1="dk1" tx1="lt1" bg2="dk2" tx2="lt2" accent1="accent1" accent2="accent2" accent3="accent3" accent4="accent4" accent5="accent5" accent6="accent6" hlink="hlink" folHlink="folHlink"/>
   </p:clrMapOvr>
 </p:sld>
 </file>

</xml_diff>